<commit_message>
update ai dispatcher doc
Signed-off-by: Frederic Huang <kuofu.huang@prophetstor.com>
</commit_message>
<xml_diff>
--- a/ai-dispatcher/docs/drift.pptx
+++ b/ai-dispatcher/docs/drift.pptx
@@ -270,7 +270,7 @@
           <a:p>
             <a:fld id="{851AEE95-2569-4C43-9BD1-B77EE05EAFB8}" type="datetimeFigureOut">
               <a:rPr lang="en-US" smtClean="0"/>
-              <a:t>11/5/2019</a:t>
+              <a:t>11/28/2019</a:t>
             </a:fld>
             <a:endParaRPr lang="en-US"/>
           </a:p>
@@ -468,7 +468,7 @@
           <a:p>
             <a:fld id="{851AEE95-2569-4C43-9BD1-B77EE05EAFB8}" type="datetimeFigureOut">
               <a:rPr lang="en-US" smtClean="0"/>
-              <a:t>11/5/2019</a:t>
+              <a:t>11/28/2019</a:t>
             </a:fld>
             <a:endParaRPr lang="en-US"/>
           </a:p>
@@ -676,7 +676,7 @@
           <a:p>
             <a:fld id="{851AEE95-2569-4C43-9BD1-B77EE05EAFB8}" type="datetimeFigureOut">
               <a:rPr lang="en-US" smtClean="0"/>
-              <a:t>11/5/2019</a:t>
+              <a:t>11/28/2019</a:t>
             </a:fld>
             <a:endParaRPr lang="en-US"/>
           </a:p>
@@ -874,7 +874,7 @@
           <a:p>
             <a:fld id="{851AEE95-2569-4C43-9BD1-B77EE05EAFB8}" type="datetimeFigureOut">
               <a:rPr lang="en-US" smtClean="0"/>
-              <a:t>11/5/2019</a:t>
+              <a:t>11/28/2019</a:t>
             </a:fld>
             <a:endParaRPr lang="en-US"/>
           </a:p>
@@ -1149,7 +1149,7 @@
           <a:p>
             <a:fld id="{851AEE95-2569-4C43-9BD1-B77EE05EAFB8}" type="datetimeFigureOut">
               <a:rPr lang="en-US" smtClean="0"/>
-              <a:t>11/5/2019</a:t>
+              <a:t>11/28/2019</a:t>
             </a:fld>
             <a:endParaRPr lang="en-US"/>
           </a:p>
@@ -1414,7 +1414,7 @@
           <a:p>
             <a:fld id="{851AEE95-2569-4C43-9BD1-B77EE05EAFB8}" type="datetimeFigureOut">
               <a:rPr lang="en-US" smtClean="0"/>
-              <a:t>11/5/2019</a:t>
+              <a:t>11/28/2019</a:t>
             </a:fld>
             <a:endParaRPr lang="en-US"/>
           </a:p>
@@ -1826,7 +1826,7 @@
           <a:p>
             <a:fld id="{851AEE95-2569-4C43-9BD1-B77EE05EAFB8}" type="datetimeFigureOut">
               <a:rPr lang="en-US" smtClean="0"/>
-              <a:t>11/5/2019</a:t>
+              <a:t>11/28/2019</a:t>
             </a:fld>
             <a:endParaRPr lang="en-US"/>
           </a:p>
@@ -1967,7 +1967,7 @@
           <a:p>
             <a:fld id="{851AEE95-2569-4C43-9BD1-B77EE05EAFB8}" type="datetimeFigureOut">
               <a:rPr lang="en-US" smtClean="0"/>
-              <a:t>11/5/2019</a:t>
+              <a:t>11/28/2019</a:t>
             </a:fld>
             <a:endParaRPr lang="en-US"/>
           </a:p>
@@ -2080,7 +2080,7 @@
           <a:p>
             <a:fld id="{851AEE95-2569-4C43-9BD1-B77EE05EAFB8}" type="datetimeFigureOut">
               <a:rPr lang="en-US" smtClean="0"/>
-              <a:t>11/5/2019</a:t>
+              <a:t>11/28/2019</a:t>
             </a:fld>
             <a:endParaRPr lang="en-US"/>
           </a:p>
@@ -2391,7 +2391,7 @@
           <a:p>
             <a:fld id="{851AEE95-2569-4C43-9BD1-B77EE05EAFB8}" type="datetimeFigureOut">
               <a:rPr lang="en-US" smtClean="0"/>
-              <a:t>11/5/2019</a:t>
+              <a:t>11/28/2019</a:t>
             </a:fld>
             <a:endParaRPr lang="en-US"/>
           </a:p>
@@ -2679,7 +2679,7 @@
           <a:p>
             <a:fld id="{851AEE95-2569-4C43-9BD1-B77EE05EAFB8}" type="datetimeFigureOut">
               <a:rPr lang="en-US" smtClean="0"/>
-              <a:t>11/5/2019</a:t>
+              <a:t>11/28/2019</a:t>
             </a:fld>
             <a:endParaRPr lang="en-US"/>
           </a:p>
@@ -2920,7 +2920,7 @@
           <a:p>
             <a:fld id="{851AEE95-2569-4C43-9BD1-B77EE05EAFB8}" type="datetimeFigureOut">
               <a:rPr lang="en-US" smtClean="0"/>
-              <a:t>11/5/2019</a:t>
+              <a:t>11/28/2019</a:t>
             </a:fld>
             <a:endParaRPr lang="en-US"/>
           </a:p>
@@ -6690,7 +6690,7 @@
         <p:spPr>
           <a:xfrm>
             <a:off x="14894" y="5388930"/>
-            <a:ext cx="2177748" cy="646331"/>
+            <a:ext cx="2177748" cy="830997"/>
           </a:xfrm>
           <a:prstGeom prst="rect">
             <a:avLst/>
@@ -6709,7 +6709,7 @@
             </a:r>
             <a:r>
               <a:rPr lang="en-US" altLang="zh-TW" sz="1200" dirty="0"/>
-              <a:t> Once model job is done, send complete job to queue to notify AI dispatcher</a:t>
+              <a:t> Once model job is done, send complete job to notify AI dispatcher and a new predict job to use new model to predict</a:t>
             </a:r>
             <a:endParaRPr lang="en-US" sz="1200" dirty="0"/>
           </a:p>

</xml_diff>